<commit_message>
discussion in, link to overleaf in README
</commit_message>
<xml_diff>
--- a/ICML_workshop_submission/icml2016stylefiles/Figures.pptx
+++ b/ICML_workshop_submission/icml2016stylefiles/Figures.pptx
@@ -3096,22 +3096,142 @@
           <a:chExt cx="0" cy="0"/>
         </a:xfrm>
       </p:grpSpPr>
+      <p:sp>
+        <p:nvSpPr>
+          <p:cNvPr id="6" name="TextBox 5"/>
+          <p:cNvSpPr txBox="1"/>
+          <p:nvPr/>
+        </p:nvSpPr>
+        <p:spPr>
+          <a:xfrm>
+            <a:off x="1096098" y="245776"/>
+            <a:ext cx="917401" cy="369332"/>
+          </a:xfrm>
+          <a:prstGeom prst="rect">
+            <a:avLst/>
+          </a:prstGeom>
+          <a:noFill/>
+        </p:spPr>
+        <p:txBody>
+          <a:bodyPr wrap="none" rtlCol="0">
+            <a:spAutoFit/>
+          </a:bodyPr>
+          <a:lstStyle/>
+          <a:p>
+            <a:r>
+              <a:rPr lang="en-US" dirty="0" smtClean="0"/>
+              <a:t>Original</a:t>
+            </a:r>
+            <a:endParaRPr lang="en-US" dirty="0"/>
+          </a:p>
+        </p:txBody>
+      </p:sp>
+      <p:sp>
+        <p:nvSpPr>
+          <p:cNvPr id="7" name="TextBox 6"/>
+          <p:cNvSpPr txBox="1"/>
+          <p:nvPr/>
+        </p:nvSpPr>
+        <p:spPr>
+          <a:xfrm>
+            <a:off x="2615889" y="247970"/>
+            <a:ext cx="1984776" cy="369332"/>
+          </a:xfrm>
+          <a:prstGeom prst="rect">
+            <a:avLst/>
+          </a:prstGeom>
+          <a:noFill/>
+        </p:spPr>
+        <p:txBody>
+          <a:bodyPr wrap="none" rtlCol="0">
+            <a:spAutoFit/>
+          </a:bodyPr>
+          <a:lstStyle/>
+          <a:p>
+            <a:r>
+              <a:rPr lang="en-US" dirty="0" smtClean="0"/>
+              <a:t>Absolute Gradients</a:t>
+            </a:r>
+            <a:endParaRPr lang="en-US" dirty="0"/>
+          </a:p>
+        </p:txBody>
+      </p:sp>
+      <p:sp>
+        <p:nvSpPr>
+          <p:cNvPr id="8" name="TextBox 7"/>
+          <p:cNvSpPr txBox="1"/>
+          <p:nvPr/>
+        </p:nvSpPr>
+        <p:spPr>
+          <a:xfrm>
+            <a:off x="4827537" y="250165"/>
+            <a:ext cx="1800267" cy="369332"/>
+          </a:xfrm>
+          <a:prstGeom prst="rect">
+            <a:avLst/>
+          </a:prstGeom>
+          <a:noFill/>
+        </p:spPr>
+        <p:txBody>
+          <a:bodyPr wrap="none" rtlCol="0">
+            <a:spAutoFit/>
+          </a:bodyPr>
+          <a:lstStyle/>
+          <a:p>
+            <a:r>
+              <a:rPr lang="en-US" dirty="0" smtClean="0"/>
+              <a:t>Positive grad*inp</a:t>
+            </a:r>
+            <a:endParaRPr lang="en-US" dirty="0"/>
+          </a:p>
+        </p:txBody>
+      </p:sp>
+      <p:sp>
+        <p:nvSpPr>
+          <p:cNvPr id="9" name="TextBox 8"/>
+          <p:cNvSpPr txBox="1"/>
+          <p:nvPr/>
+        </p:nvSpPr>
+        <p:spPr>
+          <a:xfrm>
+            <a:off x="6798709" y="266015"/>
+            <a:ext cx="1737375" cy="369332"/>
+          </a:xfrm>
+          <a:prstGeom prst="rect">
+            <a:avLst/>
+          </a:prstGeom>
+          <a:noFill/>
+        </p:spPr>
+        <p:txBody>
+          <a:bodyPr wrap="none" rtlCol="0">
+            <a:spAutoFit/>
+          </a:bodyPr>
+          <a:lstStyle/>
+          <a:p>
+            <a:r>
+              <a:rPr lang="en-US" dirty="0" smtClean="0"/>
+              <a:t>Positive LIFTPAD</a:t>
+            </a:r>
+            <a:endParaRPr lang="en-US" dirty="0"/>
+          </a:p>
+        </p:txBody>
+      </p:sp>
       <p:pic>
         <p:nvPicPr>
-          <p:cNvPr id="5" name="Picture 4" descr="Screen Shot 2016-05-01 at 4.19.45 AM.png"/>
+          <p:cNvPr id="2" name="Picture 1" descr="download.png"/>
           <p:cNvPicPr>
             <a:picLocks noChangeAspect="1"/>
           </p:cNvPicPr>
           <p:nvPr/>
         </p:nvPicPr>
-        <p:blipFill>
+        <p:blipFill rotWithShape="1">
           <a:blip r:embed="rId2">
             <a:extLst>
               <a:ext uri="{BEBA8EAE-BF5A-486C-A8C5-ECC9F3942E4B}">
                 <a14:imgProps xmlns:a14="http://schemas.microsoft.com/office/drawing/2010/main">
                   <a14:imgLayer r:embed="rId3">
                     <a14:imgEffect>
-                      <a14:brightnessContrast bright="20000" contrast="40000"/>
+                      <a14:brightnessContrast contrast="-40000"/>
                     </a14:imgEffect>
                   </a14:imgLayer>
                 </a14:imgProps>
@@ -3121,140 +3241,19 @@
               </a:ext>
             </a:extLst>
           </a:blip>
-          <a:stretch>
-            <a:fillRect/>
-          </a:stretch>
+          <a:srcRect t="24582"/>
+          <a:stretch/>
         </p:blipFill>
         <p:spPr>
           <a:xfrm>
-            <a:off x="477933" y="587483"/>
-            <a:ext cx="8165355" cy="6065692"/>
+            <a:off x="305577" y="557616"/>
+            <a:ext cx="8497247" cy="5622716"/>
           </a:xfrm>
           <a:prstGeom prst="rect">
             <a:avLst/>
           </a:prstGeom>
         </p:spPr>
       </p:pic>
-      <p:sp>
-        <p:nvSpPr>
-          <p:cNvPr id="6" name="TextBox 5"/>
-          <p:cNvSpPr txBox="1"/>
-          <p:nvPr/>
-        </p:nvSpPr>
-        <p:spPr>
-          <a:xfrm>
-            <a:off x="1065122" y="245776"/>
-            <a:ext cx="917401" cy="369332"/>
-          </a:xfrm>
-          <a:prstGeom prst="rect">
-            <a:avLst/>
-          </a:prstGeom>
-          <a:noFill/>
-        </p:spPr>
-        <p:txBody>
-          <a:bodyPr wrap="none" rtlCol="0">
-            <a:spAutoFit/>
-          </a:bodyPr>
-          <a:lstStyle/>
-          <a:p>
-            <a:r>
-              <a:rPr lang="en-US" dirty="0" smtClean="0"/>
-              <a:t>Original</a:t>
-            </a:r>
-            <a:endParaRPr lang="en-US" dirty="0"/>
-          </a:p>
-        </p:txBody>
-      </p:sp>
-      <p:sp>
-        <p:nvSpPr>
-          <p:cNvPr id="7" name="TextBox 6"/>
-          <p:cNvSpPr txBox="1"/>
-          <p:nvPr/>
-        </p:nvSpPr>
-        <p:spPr>
-          <a:xfrm>
-            <a:off x="2569425" y="247970"/>
-            <a:ext cx="1984776" cy="369332"/>
-          </a:xfrm>
-          <a:prstGeom prst="rect">
-            <a:avLst/>
-          </a:prstGeom>
-          <a:noFill/>
-        </p:spPr>
-        <p:txBody>
-          <a:bodyPr wrap="none" rtlCol="0">
-            <a:spAutoFit/>
-          </a:bodyPr>
-          <a:lstStyle/>
-          <a:p>
-            <a:r>
-              <a:rPr lang="en-US" dirty="0" smtClean="0"/>
-              <a:t>Absolute Gradients</a:t>
-            </a:r>
-            <a:endParaRPr lang="en-US" dirty="0"/>
-          </a:p>
-        </p:txBody>
-      </p:sp>
-      <p:sp>
-        <p:nvSpPr>
-          <p:cNvPr id="8" name="TextBox 7"/>
-          <p:cNvSpPr txBox="1"/>
-          <p:nvPr/>
-        </p:nvSpPr>
-        <p:spPr>
-          <a:xfrm>
-            <a:off x="4688145" y="250165"/>
-            <a:ext cx="1800267" cy="369332"/>
-          </a:xfrm>
-          <a:prstGeom prst="rect">
-            <a:avLst/>
-          </a:prstGeom>
-          <a:noFill/>
-        </p:spPr>
-        <p:txBody>
-          <a:bodyPr wrap="none" rtlCol="0">
-            <a:spAutoFit/>
-          </a:bodyPr>
-          <a:lstStyle/>
-          <a:p>
-            <a:r>
-              <a:rPr lang="en-US" dirty="0" smtClean="0"/>
-              <a:t>Positive grad*inp</a:t>
-            </a:r>
-            <a:endParaRPr lang="en-US" dirty="0"/>
-          </a:p>
-        </p:txBody>
-      </p:sp>
-      <p:sp>
-        <p:nvSpPr>
-          <p:cNvPr id="9" name="TextBox 8"/>
-          <p:cNvSpPr txBox="1"/>
-          <p:nvPr/>
-        </p:nvSpPr>
-        <p:spPr>
-          <a:xfrm>
-            <a:off x="6752245" y="266015"/>
-            <a:ext cx="1737375" cy="369332"/>
-          </a:xfrm>
-          <a:prstGeom prst="rect">
-            <a:avLst/>
-          </a:prstGeom>
-          <a:noFill/>
-        </p:spPr>
-        <p:txBody>
-          <a:bodyPr wrap="none" rtlCol="0">
-            <a:spAutoFit/>
-          </a:bodyPr>
-          <a:lstStyle/>
-          <a:p>
-            <a:r>
-              <a:rPr lang="en-US" dirty="0" smtClean="0"/>
-              <a:t>Positive LIFTPAD</a:t>
-            </a:r>
-            <a:endParaRPr lang="en-US" dirty="0"/>
-          </a:p>
-        </p:txBody>
-      </p:sp>
     </p:spTree>
     <p:extLst>
       <p:ext uri="{BB962C8B-B14F-4D97-AF65-F5344CB8AC3E}">
@@ -3300,8 +3299,8 @@
         </p:nvSpPr>
         <p:spPr>
           <a:xfrm>
-            <a:off x="5168719" y="723645"/>
-            <a:ext cx="3144677" cy="413510"/>
+            <a:off x="2787930" y="1100910"/>
+            <a:ext cx="2803403" cy="811719"/>
           </a:xfrm>
           <a:prstGeom prst="ellipse">
             <a:avLst/>
@@ -3327,15 +3326,15 @@
           <a:p>
             <a:r>
               <a:rPr lang="en-US" sz="1600" dirty="0" smtClean="0"/>
-              <a:t>y </a:t>
+              <a:t>y = </a:t>
             </a:r>
             <a:r>
               <a:rPr lang="en-US" sz="1600" dirty="0" smtClean="0"/>
-              <a:t>= </a:t>
+              <a:t>ReLU</a:t>
             </a:r>
             <a:r>
               <a:rPr lang="en-US" sz="1600" dirty="0" smtClean="0"/>
-              <a:t>ReLU(x</a:t>
+              <a:t>(x</a:t>
             </a:r>
             <a:r>
               <a:rPr lang="en-US" sz="1600" baseline="-25000" dirty="0" smtClean="0"/>
@@ -3343,15 +3342,7 @@
             </a:r>
             <a:r>
               <a:rPr lang="en-US" sz="1600" dirty="0" smtClean="0"/>
-              <a:t> </a:t>
-            </a:r>
-            <a:r>
-              <a:rPr lang="en-US" sz="1600" dirty="0" smtClean="0"/>
-              <a:t>+ </a:t>
-            </a:r>
-            <a:r>
-              <a:rPr lang="en-US" sz="1600" dirty="0" smtClean="0"/>
-              <a:t>2x</a:t>
+              <a:t> + 2x</a:t>
             </a:r>
             <a:r>
               <a:rPr lang="en-US" sz="1600" baseline="-25000" dirty="0" smtClean="0"/>
@@ -3359,15 +3350,17 @@
             </a:r>
             <a:r>
               <a:rPr lang="en-US" sz="1600" dirty="0" smtClean="0"/>
-              <a:t> </a:t>
+              <a:t> + 2</a:t>
             </a:r>
             <a:r>
               <a:rPr lang="en-US" sz="1600" dirty="0" smtClean="0"/>
-              <a:t>+ </a:t>
-            </a:r>
+              <a:t>)</a:t>
+            </a:r>
+          </a:p>
+          <a:p>
             <a:r>
               <a:rPr lang="en-US" sz="1600" dirty="0" smtClean="0"/>
-              <a:t>2) = 0</a:t>
+              <a:t>   = 0; ref=2</a:t>
             </a:r>
             <a:endParaRPr lang="en-US" sz="1600" dirty="0"/>
           </a:p>
@@ -3381,7 +3374,7 @@
         </p:nvSpPr>
         <p:spPr>
           <a:xfrm>
-            <a:off x="6914346" y="1357128"/>
+            <a:off x="1141720" y="1632542"/>
             <a:ext cx="1399049" cy="357537"/>
           </a:xfrm>
           <a:prstGeom prst="rect">
@@ -3431,7 +3424,7 @@
         </p:nvSpPr>
         <p:spPr>
           <a:xfrm>
-            <a:off x="5168719" y="1357128"/>
+            <a:off x="1141720" y="999591"/>
             <a:ext cx="1392234" cy="357537"/>
           </a:xfrm>
           <a:prstGeom prst="rect">
@@ -3477,15 +3470,15 @@
         <p:nvCxnSpPr>
           <p:cNvPr id="9" name="Straight Connector 8"/>
           <p:cNvCxnSpPr>
-            <a:stCxn id="5" idx="4"/>
-            <a:endCxn id="7" idx="0"/>
+            <a:stCxn id="5" idx="2"/>
+            <a:endCxn id="7" idx="3"/>
           </p:cNvCxnSpPr>
           <p:nvPr/>
         </p:nvCxnSpPr>
         <p:spPr>
-          <a:xfrm flipH="1">
-            <a:off x="5864836" y="1137155"/>
-            <a:ext cx="876222" cy="219973"/>
+          <a:xfrm flipH="1" flipV="1">
+            <a:off x="2533954" y="1178360"/>
+            <a:ext cx="253976" cy="328410"/>
           </a:xfrm>
           <a:prstGeom prst="line">
             <a:avLst/>
@@ -3510,15 +3503,15 @@
         <p:nvCxnSpPr>
           <p:cNvPr id="11" name="Straight Connector 10"/>
           <p:cNvCxnSpPr>
-            <a:stCxn id="5" idx="4"/>
-            <a:endCxn id="6" idx="0"/>
+            <a:stCxn id="5" idx="2"/>
+            <a:endCxn id="6" idx="3"/>
           </p:cNvCxnSpPr>
           <p:nvPr/>
         </p:nvCxnSpPr>
         <p:spPr>
-          <a:xfrm>
-            <a:off x="6741058" y="1137155"/>
-            <a:ext cx="872813" cy="219973"/>
+          <a:xfrm flipH="1">
+            <a:off x="2540769" y="1506770"/>
+            <a:ext cx="247161" cy="304541"/>
           </a:xfrm>
           <a:prstGeom prst="line">
             <a:avLst/>
@@ -3539,42 +3532,6 @@
           </a:fontRef>
         </p:style>
       </p:cxnSp>
-      <p:cxnSp>
-        <p:nvCxnSpPr>
-          <p:cNvPr id="34" name="Straight Arrow Connector 33"/>
-          <p:cNvCxnSpPr>
-            <a:stCxn id="5" idx="0"/>
-            <a:endCxn id="35" idx="4"/>
-          </p:cNvCxnSpPr>
-          <p:nvPr/>
-        </p:nvCxnSpPr>
-        <p:spPr>
-          <a:xfrm flipH="1" flipV="1">
-            <a:off x="6733414" y="443047"/>
-            <a:ext cx="7644" cy="280598"/>
-          </a:xfrm>
-          <a:prstGeom prst="straightConnector1">
-            <a:avLst/>
-          </a:prstGeom>
-          <a:ln>
-            <a:tailEnd type="arrow"/>
-          </a:ln>
-        </p:spPr>
-        <p:style>
-          <a:lnRef idx="2">
-            <a:schemeClr val="accent1"/>
-          </a:lnRef>
-          <a:fillRef idx="0">
-            <a:schemeClr val="accent1"/>
-          </a:fillRef>
-          <a:effectRef idx="1">
-            <a:schemeClr val="accent1"/>
-          </a:effectRef>
-          <a:fontRef idx="minor">
-            <a:schemeClr val="tx1"/>
-          </a:fontRef>
-        </p:style>
-      </p:cxnSp>
       <p:sp>
         <p:nvSpPr>
           <p:cNvPr id="35" name="Oval 34"/>
@@ -3583,8 +3540,8 @@
         </p:nvSpPr>
         <p:spPr>
           <a:xfrm>
-            <a:off x="5773609" y="132914"/>
-            <a:ext cx="1919610" cy="310133"/>
+            <a:off x="5773631" y="1139001"/>
+            <a:ext cx="2249397" cy="718780"/>
           </a:xfrm>
           <a:prstGeom prst="ellipse">
             <a:avLst/>
@@ -3611,12 +3568,49 @@
             <a:pPr algn="ctr"/>
             <a:r>
               <a:rPr lang="en-US" dirty="0" smtClean="0"/>
-              <a:t>sigmoid(y-2)</a:t>
+              <a:t>sigmoid(y-2</a:t>
+            </a:r>
+            <a:r>
+              <a:rPr lang="en-US" dirty="0" smtClean="0"/>
+              <a:t>) = 0.1; ref=0.5 </a:t>
             </a:r>
             <a:endParaRPr lang="en-US" dirty="0"/>
           </a:p>
         </p:txBody>
       </p:sp>
+      <p:cxnSp>
+        <p:nvCxnSpPr>
+          <p:cNvPr id="30" name="Straight Connector 29"/>
+          <p:cNvCxnSpPr>
+            <a:stCxn id="5" idx="6"/>
+            <a:endCxn id="35" idx="2"/>
+          </p:cNvCxnSpPr>
+          <p:nvPr/>
+        </p:nvCxnSpPr>
+        <p:spPr>
+          <a:xfrm flipV="1">
+            <a:off x="5591333" y="1498391"/>
+            <a:ext cx="182298" cy="8379"/>
+          </a:xfrm>
+          <a:prstGeom prst="line">
+            <a:avLst/>
+          </a:prstGeom>
+        </p:spPr>
+        <p:style>
+          <a:lnRef idx="2">
+            <a:schemeClr val="accent1"/>
+          </a:lnRef>
+          <a:fillRef idx="0">
+            <a:schemeClr val="accent1"/>
+          </a:fillRef>
+          <a:effectRef idx="1">
+            <a:schemeClr val="accent1"/>
+          </a:effectRef>
+          <a:fontRef idx="minor">
+            <a:schemeClr val="tx1"/>
+          </a:fontRef>
+        </p:style>
+      </p:cxnSp>
     </p:spTree>
     <p:extLst>
       <p:ext uri="{BB962C8B-B14F-4D97-AF65-F5344CB8AC3E}">

</xml_diff>

<commit_message>
added derivation of equivalence to LRP
</commit_message>
<xml_diff>
--- a/ICML_workshop_submission/icml2016stylefiles/Figures.pptx
+++ b/ICML_workshop_submission/icml2016stylefiles/Figures.pptx
@@ -289,7 +289,7 @@
           <a:p>
             <a:fld id="{5F35F0E2-28AD-CC4A-8B56-6483694251DB}" type="datetimeFigureOut">
               <a:rPr lang="en-US" smtClean="0"/>
-              <a:t>5/3/16</a:t>
+              <a:t>5/5/16</a:t>
             </a:fld>
             <a:endParaRPr lang="en-US"/>
           </a:p>
@@ -459,7 +459,7 @@
           <a:p>
             <a:fld id="{5F35F0E2-28AD-CC4A-8B56-6483694251DB}" type="datetimeFigureOut">
               <a:rPr lang="en-US" smtClean="0"/>
-              <a:t>5/3/16</a:t>
+              <a:t>5/5/16</a:t>
             </a:fld>
             <a:endParaRPr lang="en-US"/>
           </a:p>
@@ -639,7 +639,7 @@
           <a:p>
             <a:fld id="{5F35F0E2-28AD-CC4A-8B56-6483694251DB}" type="datetimeFigureOut">
               <a:rPr lang="en-US" smtClean="0"/>
-              <a:t>5/3/16</a:t>
+              <a:t>5/5/16</a:t>
             </a:fld>
             <a:endParaRPr lang="en-US"/>
           </a:p>
@@ -809,7 +809,7 @@
           <a:p>
             <a:fld id="{5F35F0E2-28AD-CC4A-8B56-6483694251DB}" type="datetimeFigureOut">
               <a:rPr lang="en-US" smtClean="0"/>
-              <a:t>5/3/16</a:t>
+              <a:t>5/5/16</a:t>
             </a:fld>
             <a:endParaRPr lang="en-US"/>
           </a:p>
@@ -1055,7 +1055,7 @@
           <a:p>
             <a:fld id="{5F35F0E2-28AD-CC4A-8B56-6483694251DB}" type="datetimeFigureOut">
               <a:rPr lang="en-US" smtClean="0"/>
-              <a:t>5/3/16</a:t>
+              <a:t>5/5/16</a:t>
             </a:fld>
             <a:endParaRPr lang="en-US"/>
           </a:p>
@@ -1343,7 +1343,7 @@
           <a:p>
             <a:fld id="{5F35F0E2-28AD-CC4A-8B56-6483694251DB}" type="datetimeFigureOut">
               <a:rPr lang="en-US" smtClean="0"/>
-              <a:t>5/3/16</a:t>
+              <a:t>5/5/16</a:t>
             </a:fld>
             <a:endParaRPr lang="en-US"/>
           </a:p>
@@ -1765,7 +1765,7 @@
           <a:p>
             <a:fld id="{5F35F0E2-28AD-CC4A-8B56-6483694251DB}" type="datetimeFigureOut">
               <a:rPr lang="en-US" smtClean="0"/>
-              <a:t>5/3/16</a:t>
+              <a:t>5/5/16</a:t>
             </a:fld>
             <a:endParaRPr lang="en-US"/>
           </a:p>
@@ -1883,7 +1883,7 @@
           <a:p>
             <a:fld id="{5F35F0E2-28AD-CC4A-8B56-6483694251DB}" type="datetimeFigureOut">
               <a:rPr lang="en-US" smtClean="0"/>
-              <a:t>5/3/16</a:t>
+              <a:t>5/5/16</a:t>
             </a:fld>
             <a:endParaRPr lang="en-US"/>
           </a:p>
@@ -1978,7 +1978,7 @@
           <a:p>
             <a:fld id="{5F35F0E2-28AD-CC4A-8B56-6483694251DB}" type="datetimeFigureOut">
               <a:rPr lang="en-US" smtClean="0"/>
-              <a:t>5/3/16</a:t>
+              <a:t>5/5/16</a:t>
             </a:fld>
             <a:endParaRPr lang="en-US"/>
           </a:p>
@@ -2255,7 +2255,7 @@
           <a:p>
             <a:fld id="{5F35F0E2-28AD-CC4A-8B56-6483694251DB}" type="datetimeFigureOut">
               <a:rPr lang="en-US" smtClean="0"/>
-              <a:t>5/3/16</a:t>
+              <a:t>5/5/16</a:t>
             </a:fld>
             <a:endParaRPr lang="en-US"/>
           </a:p>
@@ -2508,7 +2508,7 @@
           <a:p>
             <a:fld id="{5F35F0E2-28AD-CC4A-8B56-6483694251DB}" type="datetimeFigureOut">
               <a:rPr lang="en-US" smtClean="0"/>
-              <a:t>5/3/16</a:t>
+              <a:t>5/5/16</a:t>
             </a:fld>
             <a:endParaRPr lang="en-US"/>
           </a:p>
@@ -2721,7 +2721,7 @@
           <a:p>
             <a:fld id="{5F35F0E2-28AD-CC4A-8B56-6483694251DB}" type="datetimeFigureOut">
               <a:rPr lang="en-US" smtClean="0"/>
-              <a:t>5/3/16</a:t>
+              <a:t>5/5/16</a:t>
             </a:fld>
             <a:endParaRPr lang="en-US"/>
           </a:p>
@@ -3195,7 +3195,7 @@
         <p:spPr>
           <a:xfrm>
             <a:off x="6798709" y="266015"/>
-            <a:ext cx="1737375" cy="369332"/>
+            <a:ext cx="1838965" cy="369332"/>
           </a:xfrm>
           <a:prstGeom prst="rect">
             <a:avLst/>
@@ -3210,7 +3210,11 @@
           <a:p>
             <a:r>
               <a:rPr lang="en-US" dirty="0" smtClean="0"/>
-              <a:t>Positive LIFTPAD</a:t>
+              <a:t>Positive </a:t>
+            </a:r>
+            <a:r>
+              <a:rPr lang="en-US" dirty="0" smtClean="0"/>
+              <a:t>DeepLIFT</a:t>
             </a:r>
             <a:endParaRPr lang="en-US" dirty="0"/>
           </a:p>
@@ -3231,7 +3235,7 @@
                 <a14:imgProps xmlns:a14="http://schemas.microsoft.com/office/drawing/2010/main">
                   <a14:imgLayer r:embed="rId3">
                     <a14:imgEffect>
-                      <a14:brightnessContrast contrast="-40000"/>
+                      <a14:brightnessContrast bright="20000" contrast="-40000"/>
                     </a14:imgEffect>
                   </a14:imgLayer>
                 </a14:imgProps>
@@ -3326,15 +3330,7 @@
           <a:p>
             <a:r>
               <a:rPr lang="en-US" sz="1600" dirty="0" smtClean="0"/>
-              <a:t>y = </a:t>
-            </a:r>
-            <a:r>
-              <a:rPr lang="en-US" sz="1600" dirty="0" smtClean="0"/>
-              <a:t>ReLU</a:t>
-            </a:r>
-            <a:r>
-              <a:rPr lang="en-US" sz="1600" dirty="0" smtClean="0"/>
-              <a:t>(x</a:t>
+              <a:t>y = ReLU(x</a:t>
             </a:r>
             <a:r>
               <a:rPr lang="en-US" sz="1600" baseline="-25000" dirty="0" smtClean="0"/>
@@ -3350,11 +3346,7 @@
             </a:r>
             <a:r>
               <a:rPr lang="en-US" sz="1600" dirty="0" smtClean="0"/>
-              <a:t> + 2</a:t>
-            </a:r>
-            <a:r>
-              <a:rPr lang="en-US" sz="1600" dirty="0" smtClean="0"/>
-              <a:t>)</a:t>
+              <a:t> + 2)</a:t>
             </a:r>
           </a:p>
           <a:p>
@@ -3568,11 +3560,11 @@
             <a:pPr algn="ctr"/>
             <a:r>
               <a:rPr lang="en-US" dirty="0" smtClean="0"/>
-              <a:t>sigmoid(y-2</a:t>
+              <a:t>sigmoid</a:t>
             </a:r>
             <a:r>
               <a:rPr lang="en-US" dirty="0" smtClean="0"/>
-              <a:t>) = 0.1; ref=0.5 </a:t>
+              <a:t>(y-2) = 0.1; ref=0.5 </a:t>
             </a:r>
             <a:endParaRPr lang="en-US" dirty="0"/>
           </a:p>
@@ -3621,6 +3613,13 @@
   <p:clrMapOvr>
     <a:masterClrMapping/>
   </p:clrMapOvr>
+  <p:timing>
+    <p:tnLst>
+      <p:par>
+        <p:cTn xmlns:p14="http://schemas.microsoft.com/office/powerpoint/2010/main" id="1" dur="indefinite" restart="never" nodeType="tmRoot"/>
+      </p:par>
+    </p:tnLst>
+  </p:timing>
 </p:sld>
 </file>
 

</xml_diff>